<commit_message>
delete personal contact information
</commit_message>
<xml_diff>
--- a/第五讲/智能无人机技术设计实践比赛指导书--ROS控制Tello.pptx
+++ b/第五讲/智能无人机技术设计实践比赛指导书--ROS控制Tello.pptx
@@ -216,7 +216,7 @@
           <a:p>
             <a:fld id="{F1AD6FC6-EA67-4F41-A84A-3713D2A38186}" type="datetimeFigureOut">
               <a:rPr lang="zh-CN" altLang="en-US" smtClean="0"/>
-              <a:t>2021/11/17</a:t>
+              <a:t>2021/12/20</a:t>
             </a:fld>
             <a:endParaRPr lang="zh-CN" altLang="en-US"/>
           </a:p>
@@ -381,7 +381,7 @@
           <a:p>
             <a:fld id="{34ABD739-C410-4BBA-B985-F85A0DB96196}" type="datetimeFigureOut">
               <a:rPr lang="zh-CN" altLang="en-US" smtClean="0"/>
-              <a:t>2021/11/17</a:t>
+              <a:t>2021/12/20</a:t>
             </a:fld>
             <a:endParaRPr lang="zh-CN" altLang="en-US"/>
           </a:p>
@@ -1320,7 +1320,7 @@
           <a:p>
             <a:fld id="{DE400F2E-4FD5-4A1E-9CA8-6E07AB261D37}" type="datetimeFigureOut">
               <a:rPr lang="zh-CN" altLang="en-US" smtClean="0"/>
-              <a:t>2021/11/17</a:t>
+              <a:t>2021/12/20</a:t>
             </a:fld>
             <a:endParaRPr lang="zh-CN" altLang="en-US"/>
           </a:p>
@@ -1567,7 +1567,7 @@
           <a:p>
             <a:fld id="{DE400F2E-4FD5-4A1E-9CA8-6E07AB261D37}" type="datetimeFigureOut">
               <a:rPr lang="zh-CN" altLang="en-US" smtClean="0"/>
-              <a:t>2021/11/17</a:t>
+              <a:t>2021/12/20</a:t>
             </a:fld>
             <a:endParaRPr lang="zh-CN" altLang="en-US"/>
           </a:p>
@@ -1730,7 +1730,7 @@
           <a:p>
             <a:fld id="{DE400F2E-4FD5-4A1E-9CA8-6E07AB261D37}" type="datetimeFigureOut">
               <a:rPr lang="zh-CN" altLang="en-US" smtClean="0"/>
-              <a:t>2021/11/17</a:t>
+              <a:t>2021/12/20</a:t>
             </a:fld>
             <a:endParaRPr lang="zh-CN" altLang="en-US"/>
           </a:p>
@@ -1903,7 +1903,7 @@
           <a:p>
             <a:fld id="{DE400F2E-4FD5-4A1E-9CA8-6E07AB261D37}" type="datetimeFigureOut">
               <a:rPr lang="zh-CN" altLang="en-US" smtClean="0"/>
-              <a:t>2021/11/17</a:t>
+              <a:t>2021/12/20</a:t>
             </a:fld>
             <a:endParaRPr lang="zh-CN" altLang="en-US"/>
           </a:p>
@@ -2246,7 +2246,7 @@
           <a:p>
             <a:fld id="{DE400F2E-4FD5-4A1E-9CA8-6E07AB261D37}" type="datetimeFigureOut">
               <a:rPr lang="zh-CN" altLang="en-US" smtClean="0"/>
-              <a:t>2021/11/17</a:t>
+              <a:t>2021/12/20</a:t>
             </a:fld>
             <a:endParaRPr lang="zh-CN" altLang="en-US"/>
           </a:p>
@@ -2409,7 +2409,7 @@
           <a:p>
             <a:fld id="{DE400F2E-4FD5-4A1E-9CA8-6E07AB261D37}" type="datetimeFigureOut">
               <a:rPr lang="zh-CN" altLang="en-US" smtClean="0"/>
-              <a:t>2021/11/17</a:t>
+              <a:t>2021/12/20</a:t>
             </a:fld>
             <a:endParaRPr lang="zh-CN" altLang="en-US"/>
           </a:p>
@@ -2649,7 +2649,7 @@
           <a:p>
             <a:fld id="{DE400F2E-4FD5-4A1E-9CA8-6E07AB261D37}" type="datetimeFigureOut">
               <a:rPr lang="zh-CN" altLang="en-US" smtClean="0"/>
-              <a:t>2021/11/17</a:t>
+              <a:t>2021/12/20</a:t>
             </a:fld>
             <a:endParaRPr lang="zh-CN" altLang="en-US"/>
           </a:p>
@@ -2873,7 +2873,7 @@
           <a:p>
             <a:fld id="{DE400F2E-4FD5-4A1E-9CA8-6E07AB261D37}" type="datetimeFigureOut">
               <a:rPr lang="zh-CN" altLang="en-US" smtClean="0"/>
-              <a:t>2021/11/17</a:t>
+              <a:t>2021/12/20</a:t>
             </a:fld>
             <a:endParaRPr lang="zh-CN" altLang="en-US"/>
           </a:p>
@@ -3232,7 +3232,7 @@
           <a:p>
             <a:fld id="{DE400F2E-4FD5-4A1E-9CA8-6E07AB261D37}" type="datetimeFigureOut">
               <a:rPr lang="zh-CN" altLang="en-US" smtClean="0"/>
-              <a:t>2021/11/17</a:t>
+              <a:t>2021/12/20</a:t>
             </a:fld>
             <a:endParaRPr lang="zh-CN" altLang="en-US"/>
           </a:p>
@@ -3344,7 +3344,7 @@
           <a:p>
             <a:fld id="{DE400F2E-4FD5-4A1E-9CA8-6E07AB261D37}" type="datetimeFigureOut">
               <a:rPr lang="zh-CN" altLang="en-US" smtClean="0"/>
-              <a:t>2021/11/17</a:t>
+              <a:t>2021/12/20</a:t>
             </a:fld>
             <a:endParaRPr lang="zh-CN" altLang="en-US"/>
           </a:p>
@@ -3434,7 +3434,7 @@
           <a:p>
             <a:fld id="{DE400F2E-4FD5-4A1E-9CA8-6E07AB261D37}" type="datetimeFigureOut">
               <a:rPr lang="zh-CN" altLang="en-US" smtClean="0"/>
-              <a:t>2021/11/17</a:t>
+              <a:t>2021/12/20</a:t>
             </a:fld>
             <a:endParaRPr lang="zh-CN" altLang="en-US"/>
           </a:p>
@@ -4687,7 +4687,7 @@
           <a:p>
             <a:fld id="{DE400F2E-4FD5-4A1E-9CA8-6E07AB261D37}" type="datetimeFigureOut">
               <a:rPr lang="zh-CN" altLang="en-US" smtClean="0"/>
-              <a:t>2021/11/17</a:t>
+              <a:t>2021/12/20</a:t>
             </a:fld>
             <a:endParaRPr lang="zh-CN" altLang="en-US"/>
           </a:p>
@@ -5223,14 +5223,6 @@
           <a:bodyPr/>
           <a:lstStyle/>
           <a:p>
-            <a:r>
-              <a:rPr lang="zh-CN" altLang="en-US" dirty="0">
-                <a:latin typeface="Times New Roman" panose="02020603050405020304" pitchFamily="18" charset="0"/>
-                <a:ea typeface="楷体" panose="02010609060101010101" pitchFamily="49" charset="-122"/>
-                <a:cs typeface="Times New Roman" panose="02020603050405020304" pitchFamily="18" charset="0"/>
-              </a:rPr>
-              <a:t>徐远帆</a:t>
-            </a:r>
             <a:endParaRPr lang="en-US" altLang="zh-CN" dirty="0">
               <a:latin typeface="Times New Roman" panose="02020603050405020304" pitchFamily="18" charset="0"/>
               <a:ea typeface="楷体" panose="02010609060101010101" pitchFamily="49" charset="-122"/>
@@ -5238,32 +5230,7 @@
             </a:endParaRPr>
           </a:p>
           <a:p>
-            <a:r>
-              <a:rPr lang="zh-CN" altLang="en-US" dirty="0">
-                <a:latin typeface="Times New Roman" panose="02020603050405020304" pitchFamily="18" charset="0"/>
-                <a:ea typeface="楷体" panose="02010609060101010101" pitchFamily="49" charset="-122"/>
-                <a:cs typeface="Times New Roman" panose="02020603050405020304" pitchFamily="18" charset="0"/>
-              </a:rPr>
-              <a:t>联系方式</a:t>
-            </a:r>
-            <a:r>
-              <a:rPr lang="en-US" altLang="zh-CN" dirty="0">
-                <a:latin typeface="Times New Roman" panose="02020603050405020304" pitchFamily="18" charset="0"/>
-                <a:ea typeface="楷体" panose="02010609060101010101" pitchFamily="49" charset="-122"/>
-                <a:cs typeface="Times New Roman" panose="02020603050405020304" pitchFamily="18" charset="0"/>
-              </a:rPr>
-              <a:t>: </a:t>
-            </a:r>
-            <a:r>
-              <a:rPr lang="en-US" altLang="zh-CN" dirty="0">
-                <a:latin typeface="Times New Roman" panose="02020603050405020304" pitchFamily="18" charset="0"/>
-                <a:ea typeface="楷体" panose="02010609060101010101" pitchFamily="49" charset="-122"/>
-                <a:cs typeface="Times New Roman" panose="02020603050405020304" pitchFamily="18" charset="0"/>
-                <a:hlinkClick r:id="rId2"/>
-              </a:rPr>
-              <a:t>xuyf20@mails.tsinghua.edu.cn</a:t>
-            </a:r>
-            <a:endParaRPr lang="en-US" altLang="zh-CN" dirty="0">
+            <a:endParaRPr lang="en-US" altLang="zh-CN">
               <a:latin typeface="Times New Roman" panose="02020603050405020304" pitchFamily="18" charset="0"/>
               <a:ea typeface="楷体" panose="02010609060101010101" pitchFamily="49" charset="-122"/>
               <a:cs typeface="Times New Roman" panose="02020603050405020304" pitchFamily="18" charset="0"/>
@@ -5271,26 +5238,29 @@
           </a:p>
           <a:p>
             <a:r>
+              <a:rPr lang="zh-CN" altLang="en-US">
+                <a:latin typeface="Times New Roman" panose="02020603050405020304" pitchFamily="18" charset="0"/>
+                <a:ea typeface="楷体" panose="02010609060101010101" pitchFamily="49" charset="-122"/>
+                <a:cs typeface="Times New Roman" panose="02020603050405020304" pitchFamily="18" charset="0"/>
+              </a:rPr>
+              <a:t>时间</a:t>
+            </a:r>
+            <a:r>
               <a:rPr lang="zh-CN" altLang="en-US" dirty="0">
                 <a:latin typeface="Times New Roman" panose="02020603050405020304" pitchFamily="18" charset="0"/>
                 <a:ea typeface="楷体" panose="02010609060101010101" pitchFamily="49" charset="-122"/>
                 <a:cs typeface="Times New Roman" panose="02020603050405020304" pitchFamily="18" charset="0"/>
               </a:rPr>
-              <a:t>时间：</a:t>
-            </a:r>
-            <a:r>
-              <a:rPr lang="en-US" altLang="zh-CN">
+              <a:t>：</a:t>
+            </a:r>
+            <a:r>
+              <a:rPr lang="en-US" altLang="zh-CN" dirty="0">
                 <a:latin typeface="Times New Roman" panose="02020603050405020304" pitchFamily="18" charset="0"/>
                 <a:ea typeface="楷体" panose="02010609060101010101" pitchFamily="49" charset="-122"/>
                 <a:cs typeface="Times New Roman" panose="02020603050405020304" pitchFamily="18" charset="0"/>
               </a:rPr>
               <a:t>2021.11.13</a:t>
             </a:r>
-            <a:endParaRPr lang="en-US" altLang="zh-CN" dirty="0">
-              <a:latin typeface="Times New Roman" panose="02020603050405020304" pitchFamily="18" charset="0"/>
-              <a:ea typeface="楷体" panose="02010609060101010101" pitchFamily="49" charset="-122"/>
-              <a:cs typeface="Times New Roman" panose="02020603050405020304" pitchFamily="18" charset="0"/>
-            </a:endParaRPr>
           </a:p>
         </p:txBody>
       </p:sp>

</xml_diff>